<commit_message>
ppt JS atualização 3
</commit_message>
<xml_diff>
--- a/01 Classes/Aula 09 Desenvolvimento Web PHP - JS.pptx
+++ b/01 Classes/Aula 09 Desenvolvimento Web PHP - JS.pptx
@@ -13141,66 +13141,58 @@
                 <a:latin typeface="Times New Roman" panose="02020603050405020304" pitchFamily="18" charset="0"/>
                 <a:cs typeface="Times New Roman" panose="02020603050405020304" pitchFamily="18" charset="0"/>
               </a:rPr>
-              <a:t>Exemplo 3: for ... in </a:t>
-            </a:r>
+              <a:t>Exemplo 3: </a:t>
+            </a:r>
+          </a:p>
+          <a:p>
+            <a:pPr marL="0" indent="0" algn="just">
+              <a:buNone/>
+            </a:pPr>
+            <a:endParaRPr lang="pt-BR" sz="2400" b="1" dirty="0">
+              <a:solidFill>
+                <a:srgbClr val="FF0000"/>
+              </a:solidFill>
+              <a:latin typeface="Times New Roman" panose="02020603050405020304" pitchFamily="18" charset="0"/>
+              <a:cs typeface="Times New Roman" panose="02020603050405020304" pitchFamily="18" charset="0"/>
+            </a:endParaRPr>
+          </a:p>
+          <a:p>
+            <a:pPr marL="0" indent="0" algn="just">
+              <a:buNone/>
+            </a:pPr>
             <a:r>
               <a:rPr lang="pt-BR" sz="2400" b="1" dirty="0">
                 <a:solidFill>
-                  <a:schemeClr val="tx1"/>
-                </a:solidFill>
-                <a:latin typeface="Times New Roman" panose="02020603050405020304" pitchFamily="18" charset="0"/>
-                <a:cs typeface="Times New Roman" panose="02020603050405020304" pitchFamily="18" charset="0"/>
-              </a:rPr>
-              <a:t>:</a:t>
-            </a:r>
-          </a:p>
-          <a:p>
-            <a:pPr marL="1841500" lvl="4" indent="0" algn="just">
-              <a:buNone/>
-            </a:pPr>
-            <a:r>
-              <a:rPr lang="pt-BR" sz="2400" b="1" dirty="0" err="1">
-                <a:solidFill>
-                  <a:schemeClr val="tx1"/>
-                </a:solidFill>
-                <a:latin typeface="Times New Roman" panose="02020603050405020304" pitchFamily="18" charset="0"/>
-                <a:cs typeface="Times New Roman" panose="02020603050405020304" pitchFamily="18" charset="0"/>
-              </a:rPr>
-              <a:t>let</a:t>
-            </a:r>
-            <a:r>
-              <a:rPr lang="pt-BR" sz="2400" dirty="0">
-                <a:solidFill>
-                  <a:schemeClr val="tx1"/>
-                </a:solidFill>
-                <a:latin typeface="Times New Roman" panose="02020603050405020304" pitchFamily="18" charset="0"/>
-                <a:cs typeface="Times New Roman" panose="02020603050405020304" pitchFamily="18" charset="0"/>
-              </a:rPr>
-              <a:t> </a:t>
+                  <a:srgbClr val="FF0000"/>
+                </a:solidFill>
+                <a:latin typeface="Times New Roman" panose="02020603050405020304" pitchFamily="18" charset="0"/>
+                <a:cs typeface="Times New Roman" panose="02020603050405020304" pitchFamily="18" charset="0"/>
+              </a:rPr>
+              <a:t>		for ... in {</a:t>
             </a:r>
             <a:r>
               <a:rPr lang="pt-BR" sz="2400" b="1" dirty="0">
                 <a:solidFill>
+                  <a:schemeClr val="tx1"/>
+                </a:solidFill>
+                <a:latin typeface="Times New Roman" panose="02020603050405020304" pitchFamily="18" charset="0"/>
+                <a:cs typeface="Times New Roman" panose="02020603050405020304" pitchFamily="18" charset="0"/>
+              </a:rPr>
+              <a:t> instruções </a:t>
+            </a:r>
+            <a:r>
+              <a:rPr lang="pt-BR" sz="2400" b="1" dirty="0">
+                <a:solidFill>
                   <a:srgbClr val="FF0000"/>
                 </a:solidFill>
                 <a:latin typeface="Times New Roman" panose="02020603050405020304" pitchFamily="18" charset="0"/>
                 <a:cs typeface="Times New Roman" panose="02020603050405020304" pitchFamily="18" charset="0"/>
               </a:rPr>
-              <a:t>lista</a:t>
-            </a:r>
-            <a:r>
-              <a:rPr lang="pt-BR" sz="2400" dirty="0">
-                <a:solidFill>
-                  <a:schemeClr val="tx1"/>
-                </a:solidFill>
-                <a:latin typeface="Times New Roman" panose="02020603050405020304" pitchFamily="18" charset="0"/>
-                <a:cs typeface="Times New Roman" panose="02020603050405020304" pitchFamily="18" charset="0"/>
-              </a:rPr>
-              <a:t> = [Julia', 'Paulo’, Josy’];</a:t>
-            </a:r>
-          </a:p>
-          <a:p>
-            <a:pPr marL="1841500" lvl="4" indent="0" algn="just">
+              <a:t>}</a:t>
+            </a:r>
+          </a:p>
+          <a:p>
+            <a:pPr marL="0" indent="0" algn="just">
               <a:buNone/>
             </a:pPr>
             <a:endParaRPr lang="pt-BR" sz="2400" b="1" dirty="0">
@@ -13212,7 +13204,7 @@
             </a:endParaRPr>
           </a:p>
           <a:p>
-            <a:pPr marL="1841500" lvl="4" indent="0" algn="just">
+            <a:pPr marL="0" indent="0" algn="just">
               <a:buNone/>
             </a:pPr>
             <a:r>
@@ -13223,7 +13215,62 @@
                 <a:latin typeface="Times New Roman" panose="02020603050405020304" pitchFamily="18" charset="0"/>
                 <a:cs typeface="Times New Roman" panose="02020603050405020304" pitchFamily="18" charset="0"/>
               </a:rPr>
-              <a:t>for</a:t>
+              <a:t>		</a:t>
+            </a:r>
+            <a:r>
+              <a:rPr lang="pt-BR" sz="2400" b="1" dirty="0" err="1">
+                <a:solidFill>
+                  <a:schemeClr val="tx1"/>
+                </a:solidFill>
+                <a:latin typeface="Times New Roman" panose="02020603050405020304" pitchFamily="18" charset="0"/>
+                <a:cs typeface="Times New Roman" panose="02020603050405020304" pitchFamily="18" charset="0"/>
+              </a:rPr>
+              <a:t>let</a:t>
+            </a:r>
+            <a:r>
+              <a:rPr lang="pt-BR" sz="2400" dirty="0">
+                <a:solidFill>
+                  <a:schemeClr val="tx1"/>
+                </a:solidFill>
+                <a:latin typeface="Times New Roman" panose="02020603050405020304" pitchFamily="18" charset="0"/>
+                <a:cs typeface="Times New Roman" panose="02020603050405020304" pitchFamily="18" charset="0"/>
+              </a:rPr>
+              <a:t> </a:t>
+            </a:r>
+            <a:r>
+              <a:rPr lang="pt-BR" sz="2400" b="1" dirty="0">
+                <a:solidFill>
+                  <a:srgbClr val="FF0000"/>
+                </a:solidFill>
+                <a:latin typeface="Times New Roman" panose="02020603050405020304" pitchFamily="18" charset="0"/>
+                <a:cs typeface="Times New Roman" panose="02020603050405020304" pitchFamily="18" charset="0"/>
+              </a:rPr>
+              <a:t>lista</a:t>
+            </a:r>
+            <a:r>
+              <a:rPr lang="pt-BR" sz="2400" dirty="0">
+                <a:solidFill>
+                  <a:schemeClr val="tx1"/>
+                </a:solidFill>
+                <a:latin typeface="Times New Roman" panose="02020603050405020304" pitchFamily="18" charset="0"/>
+                <a:cs typeface="Times New Roman" panose="02020603050405020304" pitchFamily="18" charset="0"/>
+              </a:rPr>
+              <a:t> = [Julia', 'Paulo’, Josy’];</a:t>
+            </a:r>
+          </a:p>
+          <a:p>
+            <a:pPr marL="0" indent="0" algn="just">
+              <a:buNone/>
+            </a:pPr>
+            <a:r>
+              <a:rPr lang="pt-BR" sz="2400" b="1" dirty="0">
+                <a:solidFill>
+                  <a:schemeClr val="tx1"/>
+                </a:solidFill>
+                <a:latin typeface="Times New Roman" panose="02020603050405020304" pitchFamily="18" charset="0"/>
+                <a:cs typeface="Times New Roman" panose="02020603050405020304" pitchFamily="18" charset="0"/>
+              </a:rPr>
+              <a:t>		for</a:t>
             </a:r>
             <a:r>
               <a:rPr lang="pt-BR" sz="2400" dirty="0">
@@ -13275,6 +13322,11 @@
               </a:rPr>
               <a:t>) {  </a:t>
             </a:r>
+          </a:p>
+          <a:p>
+            <a:pPr marL="0" indent="0" algn="just">
+              <a:buNone/>
+            </a:pPr>
             <a:r>
               <a:rPr lang="pt-BR" sz="2400" b="1" dirty="0">
                 <a:solidFill>
@@ -13283,7 +13335,7 @@
                 <a:latin typeface="Times New Roman" panose="02020603050405020304" pitchFamily="18" charset="0"/>
                 <a:cs typeface="Times New Roman" panose="02020603050405020304" pitchFamily="18" charset="0"/>
               </a:rPr>
-              <a:t>console</a:t>
+              <a:t>			console</a:t>
             </a:r>
             <a:r>
               <a:rPr lang="pt-BR" sz="2400" dirty="0">
@@ -13313,7 +13365,22 @@
                 <a:latin typeface="Times New Roman" panose="02020603050405020304" pitchFamily="18" charset="0"/>
                 <a:cs typeface="Times New Roman" panose="02020603050405020304" pitchFamily="18" charset="0"/>
               </a:rPr>
-              <a:t>[i]); }</a:t>
+              <a:t>[i]); </a:t>
+            </a:r>
+          </a:p>
+          <a:p>
+            <a:pPr marL="0" indent="0" algn="just">
+              <a:buNone/>
+            </a:pPr>
+            <a:r>
+              <a:rPr lang="pt-BR" sz="2400" dirty="0">
+                <a:solidFill>
+                  <a:schemeClr val="tx1"/>
+                </a:solidFill>
+                <a:latin typeface="Times New Roman" panose="02020603050405020304" pitchFamily="18" charset="0"/>
+                <a:cs typeface="Times New Roman" panose="02020603050405020304" pitchFamily="18" charset="0"/>
+              </a:rPr>
+              <a:t>		}</a:t>
             </a:r>
           </a:p>
         </p:txBody>

</xml_diff>

<commit_message>
ppt JS atualização 4
</commit_message>
<xml_diff>
--- a/01 Classes/Aula 09 Desenvolvimento Web PHP - JS.pptx
+++ b/01 Classes/Aula 09 Desenvolvimento Web PHP - JS.pptx
@@ -10642,19 +10642,19 @@
               <a:t>Aulas 09</a:t>
             </a:r>
             <a:br>
-              <a:rPr lang="pt-BR" b="1" dirty="0">
+              <a:rPr lang="pt-BR" b="1">
                 <a:solidFill>
                   <a:schemeClr val="bg1"/>
                 </a:solidFill>
               </a:rPr>
             </a:br>
             <a:r>
-              <a:rPr lang="pt-BR" b="1" dirty="0">
+              <a:rPr lang="pt-BR" b="1">
                 <a:solidFill>
                   <a:schemeClr val="bg1"/>
                 </a:solidFill>
               </a:rPr>
-              <a:t>JS</a:t>
+              <a:t>JS </a:t>
             </a:r>
             <a:endParaRPr lang="pt-BR" sz="4800" b="1" dirty="0">
               <a:solidFill>

</xml_diff>

<commit_message>
ppt 9 JS atualização 6
</commit_message>
<xml_diff>
--- a/01 Classes/Aula 09 Desenvolvimento Web PHP - JS.pptx
+++ b/01 Classes/Aula 09 Desenvolvimento Web PHP - JS.pptx
@@ -17447,6 +17447,81 @@
               <a:t>: </a:t>
             </a:r>
             <a:r>
+              <a:rPr lang="pt-BR" sz="2400" b="1" dirty="0" err="1">
+                <a:solidFill>
+                  <a:srgbClr val="FF0000"/>
+                </a:solidFill>
+                <a:latin typeface="Times New Roman" panose="02020603050405020304" pitchFamily="18" charset="0"/>
+                <a:cs typeface="Times New Roman" panose="02020603050405020304" pitchFamily="18" charset="0"/>
+              </a:rPr>
+              <a:t>indexOf</a:t>
+            </a:r>
+            <a:r>
+              <a:rPr lang="pt-BR" sz="2400" dirty="0">
+                <a:solidFill>
+                  <a:schemeClr val="tx1"/>
+                </a:solidFill>
+                <a:latin typeface="Times New Roman" panose="02020603050405020304" pitchFamily="18" charset="0"/>
+                <a:cs typeface="Times New Roman" panose="02020603050405020304" pitchFamily="18" charset="0"/>
+              </a:rPr>
+              <a:t>(elemento); </a:t>
+            </a:r>
+            <a:r>
+              <a:rPr lang="pt-BR" sz="2400" b="1" dirty="0" err="1">
+                <a:solidFill>
+                  <a:srgbClr val="FF0000"/>
+                </a:solidFill>
+                <a:latin typeface="Times New Roman" panose="02020603050405020304" pitchFamily="18" charset="0"/>
+                <a:cs typeface="Times New Roman" panose="02020603050405020304" pitchFamily="18" charset="0"/>
+              </a:rPr>
+              <a:t>push</a:t>
+            </a:r>
+            <a:r>
+              <a:rPr lang="pt-BR" sz="2400" dirty="0">
+                <a:solidFill>
+                  <a:schemeClr val="tx1"/>
+                </a:solidFill>
+                <a:latin typeface="Times New Roman" panose="02020603050405020304" pitchFamily="18" charset="0"/>
+                <a:cs typeface="Times New Roman" panose="02020603050405020304" pitchFamily="18" charset="0"/>
+              </a:rPr>
+              <a:t>(elemento); </a:t>
+            </a:r>
+            <a:r>
+              <a:rPr lang="pt-BR" sz="2400" b="1" dirty="0">
+                <a:solidFill>
+                  <a:srgbClr val="FF0000"/>
+                </a:solidFill>
+                <a:latin typeface="Times New Roman" panose="02020603050405020304" pitchFamily="18" charset="0"/>
+                <a:cs typeface="Times New Roman" panose="02020603050405020304" pitchFamily="18" charset="0"/>
+              </a:rPr>
+              <a:t>pop</a:t>
+            </a:r>
+            <a:r>
+              <a:rPr lang="pt-BR" sz="2400" dirty="0">
+                <a:solidFill>
+                  <a:schemeClr val="tx1"/>
+                </a:solidFill>
+                <a:latin typeface="Times New Roman" panose="02020603050405020304" pitchFamily="18" charset="0"/>
+                <a:cs typeface="Times New Roman" panose="02020603050405020304" pitchFamily="18" charset="0"/>
+              </a:rPr>
+              <a:t>(elemento);  </a:t>
+            </a:r>
+          </a:p>
+          <a:p>
+            <a:pPr marL="0" indent="0" algn="just">
+              <a:buNone/>
+            </a:pPr>
+            <a:r>
+              <a:rPr lang="pt-BR" sz="2400" dirty="0">
+                <a:solidFill>
+                  <a:schemeClr val="tx1"/>
+                </a:solidFill>
+                <a:latin typeface="Times New Roman" panose="02020603050405020304" pitchFamily="18" charset="0"/>
+                <a:cs typeface="Times New Roman" panose="02020603050405020304" pitchFamily="18" charset="0"/>
+              </a:rPr>
+              <a:t>		     </a:t>
+            </a:r>
+            <a:r>
               <a:rPr lang="pt-BR" sz="2400" dirty="0" err="1">
                 <a:solidFill>
                   <a:schemeClr val="tx1"/>
@@ -17454,37 +17529,87 @@
                 <a:latin typeface="Times New Roman" panose="02020603050405020304" pitchFamily="18" charset="0"/>
                 <a:cs typeface="Times New Roman" panose="02020603050405020304" pitchFamily="18" charset="0"/>
               </a:rPr>
-              <a:t>indexOf</a:t>
-            </a:r>
-            <a:r>
-              <a:rPr lang="pt-BR" sz="2400" dirty="0">
-                <a:solidFill>
-                  <a:schemeClr val="tx1"/>
-                </a:solidFill>
-                <a:latin typeface="Times New Roman" panose="02020603050405020304" pitchFamily="18" charset="0"/>
-                <a:cs typeface="Times New Roman" panose="02020603050405020304" pitchFamily="18" charset="0"/>
-              </a:rPr>
-              <a:t>(elemento); </a:t>
-            </a:r>
-            <a:r>
-              <a:rPr lang="pt-BR" sz="2400" dirty="0" err="1">
-                <a:solidFill>
-                  <a:schemeClr val="tx1"/>
-                </a:solidFill>
-                <a:latin typeface="Times New Roman" panose="02020603050405020304" pitchFamily="18" charset="0"/>
-                <a:cs typeface="Times New Roman" panose="02020603050405020304" pitchFamily="18" charset="0"/>
-              </a:rPr>
-              <a:t>push</a:t>
-            </a:r>
-            <a:r>
-              <a:rPr lang="pt-BR" sz="2400" dirty="0">
-                <a:solidFill>
-                  <a:schemeClr val="tx1"/>
-                </a:solidFill>
-                <a:latin typeface="Times New Roman" panose="02020603050405020304" pitchFamily="18" charset="0"/>
-                <a:cs typeface="Times New Roman" panose="02020603050405020304" pitchFamily="18" charset="0"/>
-              </a:rPr>
-              <a:t>(elemento); pop(elemento);  </a:t>
+              <a:t>Array.</a:t>
+            </a:r>
+            <a:r>
+              <a:rPr lang="pt-BR" sz="2400" b="1" dirty="0" err="1">
+                <a:solidFill>
+                  <a:srgbClr val="FF0000"/>
+                </a:solidFill>
+                <a:latin typeface="Times New Roman" panose="02020603050405020304" pitchFamily="18" charset="0"/>
+                <a:cs typeface="Times New Roman" panose="02020603050405020304" pitchFamily="18" charset="0"/>
+              </a:rPr>
+              <a:t>isArray</a:t>
+            </a:r>
+            <a:r>
+              <a:rPr lang="pt-BR" sz="2400" dirty="0">
+                <a:solidFill>
+                  <a:schemeClr val="tx1"/>
+                </a:solidFill>
+                <a:latin typeface="Times New Roman" panose="02020603050405020304" pitchFamily="18" charset="0"/>
+                <a:cs typeface="Times New Roman" panose="02020603050405020304" pitchFamily="18" charset="0"/>
+              </a:rPr>
+              <a:t>(variável), </a:t>
+            </a:r>
+            <a:r>
+              <a:rPr lang="pt-BR" sz="2400" b="1" dirty="0">
+                <a:solidFill>
+                  <a:srgbClr val="FF0000"/>
+                </a:solidFill>
+                <a:latin typeface="Times New Roman" panose="02020603050405020304" pitchFamily="18" charset="0"/>
+                <a:cs typeface="Times New Roman" panose="02020603050405020304" pitchFamily="18" charset="0"/>
+              </a:rPr>
+              <a:t>delete</a:t>
+            </a:r>
+            <a:r>
+              <a:rPr lang="pt-BR" sz="2400" dirty="0">
+                <a:solidFill>
+                  <a:schemeClr val="tx1"/>
+                </a:solidFill>
+                <a:latin typeface="Times New Roman" panose="02020603050405020304" pitchFamily="18" charset="0"/>
+                <a:cs typeface="Times New Roman" panose="02020603050405020304" pitchFamily="18" charset="0"/>
+              </a:rPr>
+              <a:t> lista[</a:t>
+            </a:r>
+            <a:r>
+              <a:rPr lang="pt-BR" sz="2400" b="1" dirty="0">
+                <a:solidFill>
+                  <a:schemeClr val="tx1"/>
+                </a:solidFill>
+                <a:latin typeface="Times New Roman" panose="02020603050405020304" pitchFamily="18" charset="0"/>
+                <a:cs typeface="Times New Roman" panose="02020603050405020304" pitchFamily="18" charset="0"/>
+              </a:rPr>
+              <a:t>x</a:t>
+            </a:r>
+            <a:r>
+              <a:rPr lang="pt-BR" sz="2400" dirty="0">
+                <a:solidFill>
+                  <a:schemeClr val="tx1"/>
+                </a:solidFill>
+                <a:latin typeface="Times New Roman" panose="02020603050405020304" pitchFamily="18" charset="0"/>
+                <a:cs typeface="Times New Roman" panose="02020603050405020304" pitchFamily="18" charset="0"/>
+              </a:rPr>
+              <a:t>], </a:t>
+            </a:r>
+            <a:r>
+              <a:rPr lang="pt-BR" sz="2400" b="1" dirty="0" err="1">
+                <a:solidFill>
+                  <a:schemeClr val="tx1"/>
+                </a:solidFill>
+                <a:latin typeface="Times New Roman" panose="02020603050405020304" pitchFamily="18" charset="0"/>
+                <a:cs typeface="Times New Roman" panose="02020603050405020304" pitchFamily="18" charset="0"/>
+              </a:rPr>
+              <a:t>etc</a:t>
+            </a:r>
+            <a:r>
+              <a:rPr lang="pt-BR" sz="2400" dirty="0">
+                <a:solidFill>
+                  <a:schemeClr val="tx1"/>
+                </a:solidFill>
+                <a:latin typeface="Times New Roman" panose="02020603050405020304" pitchFamily="18" charset="0"/>
+                <a:cs typeface="Times New Roman" panose="02020603050405020304" pitchFamily="18" charset="0"/>
+              </a:rPr>
+              <a:t>; </a:t>
             </a:r>
           </a:p>
           <a:p>
@@ -17492,61 +17617,6 @@
               <a:buNone/>
             </a:pPr>
             <a:r>
-              <a:rPr lang="pt-BR" sz="2400" dirty="0">
-                <a:solidFill>
-                  <a:schemeClr val="tx1"/>
-                </a:solidFill>
-                <a:latin typeface="Times New Roman" panose="02020603050405020304" pitchFamily="18" charset="0"/>
-                <a:cs typeface="Times New Roman" panose="02020603050405020304" pitchFamily="18" charset="0"/>
-              </a:rPr>
-              <a:t>		     </a:t>
-            </a:r>
-            <a:r>
-              <a:rPr lang="pt-BR" sz="2400" dirty="0" err="1">
-                <a:solidFill>
-                  <a:schemeClr val="tx1"/>
-                </a:solidFill>
-                <a:latin typeface="Times New Roman" panose="02020603050405020304" pitchFamily="18" charset="0"/>
-                <a:cs typeface="Times New Roman" panose="02020603050405020304" pitchFamily="18" charset="0"/>
-              </a:rPr>
-              <a:t>Array.isArray</a:t>
-            </a:r>
-            <a:r>
-              <a:rPr lang="pt-BR" sz="2400" dirty="0">
-                <a:solidFill>
-                  <a:schemeClr val="tx1"/>
-                </a:solidFill>
-                <a:latin typeface="Times New Roman" panose="02020603050405020304" pitchFamily="18" charset="0"/>
-                <a:cs typeface="Times New Roman" panose="02020603050405020304" pitchFamily="18" charset="0"/>
-              </a:rPr>
-              <a:t>(variável), </a:t>
-            </a:r>
-            <a:r>
-              <a:rPr lang="pt-BR" sz="2400" dirty="0" err="1">
-                <a:solidFill>
-                  <a:schemeClr val="tx1"/>
-                </a:solidFill>
-                <a:latin typeface="Times New Roman" panose="02020603050405020304" pitchFamily="18" charset="0"/>
-                <a:cs typeface="Times New Roman" panose="02020603050405020304" pitchFamily="18" charset="0"/>
-              </a:rPr>
-              <a:t>etc</a:t>
-            </a:r>
-            <a:r>
-              <a:rPr lang="pt-BR" sz="2400" dirty="0">
-                <a:solidFill>
-                  <a:schemeClr val="tx1"/>
-                </a:solidFill>
-                <a:latin typeface="Times New Roman" panose="02020603050405020304" pitchFamily="18" charset="0"/>
-                <a:cs typeface="Times New Roman" panose="02020603050405020304" pitchFamily="18" charset="0"/>
-              </a:rPr>
-              <a:t>; </a:t>
-            </a:r>
-          </a:p>
-          <a:p>
-            <a:pPr marL="0" indent="0" algn="just">
-              <a:buNone/>
-            </a:pPr>
-            <a:r>
               <a:rPr lang="pt-BR" sz="2400" b="1" dirty="0">
                 <a:solidFill>
                   <a:schemeClr val="tx1"/>
@@ -17577,7 +17647,7 @@
               <a:t> </a:t>
             </a:r>
             <a:r>
-              <a:rPr lang="pt-BR" sz="2400" dirty="0" err="1">
+              <a:rPr lang="pt-BR" sz="2400" b="1" dirty="0" err="1">
                 <a:solidFill>
                   <a:schemeClr val="tx1"/>
                 </a:solidFill>
@@ -18196,7 +18266,17 @@
                 <a:latin typeface="Times New Roman" panose="02020603050405020304" pitchFamily="18" charset="0"/>
                 <a:cs typeface="Times New Roman" panose="02020603050405020304" pitchFamily="18" charset="0"/>
               </a:rPr>
-              <a:t>lista.join</a:t>
+              <a:t>lista.</a:t>
+            </a:r>
+            <a:r>
+              <a:rPr lang="pt-BR" sz="2400" b="1" dirty="0" err="1">
+                <a:solidFill>
+                  <a:schemeClr val="tx1"/>
+                </a:solidFill>
+                <a:latin typeface="Times New Roman" panose="02020603050405020304" pitchFamily="18" charset="0"/>
+                <a:cs typeface="Times New Roman" panose="02020603050405020304" pitchFamily="18" charset="0"/>
+              </a:rPr>
+              <a:t>join</a:t>
             </a:r>
             <a:r>
               <a:rPr lang="pt-BR" sz="2400" dirty="0">

</xml_diff>

<commit_message>
Exemplo PHP 08/10/2024 2024.2
</commit_message>
<xml_diff>
--- a/01 Classes/Aula 09 Desenvolvimento Web PHP - JS.pptx
+++ b/01 Classes/Aula 09 Desenvolvimento Web PHP - JS.pptx
@@ -9006,8 +9006,25 @@
                 <a:latin typeface="Times New Roman" panose="02020603050405020304" pitchFamily="18" charset="0"/>
                 <a:cs typeface="Times New Roman" panose="02020603050405020304" pitchFamily="18" charset="0"/>
               </a:rPr>
-              <a:t> idade = 16, eleitor;</a:t>
-            </a:r>
+              <a:t> idade </a:t>
+            </a:r>
+            <a:r>
+              <a:rPr lang="pt-BR" sz="2400">
+                <a:solidFill>
+                  <a:schemeClr val="tx1"/>
+                </a:solidFill>
+                <a:latin typeface="Times New Roman" panose="02020603050405020304" pitchFamily="18" charset="0"/>
+                <a:cs typeface="Times New Roman" panose="02020603050405020304" pitchFamily="18" charset="0"/>
+              </a:rPr>
+              <a:t>= 16;</a:t>
+            </a:r>
+            <a:endParaRPr lang="pt-BR" sz="2400" dirty="0">
+              <a:solidFill>
+                <a:schemeClr val="tx1"/>
+              </a:solidFill>
+              <a:latin typeface="Times New Roman" panose="02020603050405020304" pitchFamily="18" charset="0"/>
+              <a:cs typeface="Times New Roman" panose="02020603050405020304" pitchFamily="18" charset="0"/>
+            </a:endParaRPr>
           </a:p>
           <a:p>
             <a:pPr marL="0" indent="0" algn="just">
@@ -16781,7 +16798,7 @@
                 <a:latin typeface="Times New Roman" panose="02020603050405020304" pitchFamily="18" charset="0"/>
                 <a:cs typeface="Times New Roman" panose="02020603050405020304" pitchFamily="18" charset="0"/>
               </a:rPr>
-              <a:t> = </a:t>
+              <a:t> </a:t>
             </a:r>
             <a:r>
               <a:rPr lang="pt-BR" sz="2400" b="1" dirty="0">
@@ -16791,17 +16808,17 @@
                 <a:latin typeface="Times New Roman" panose="02020603050405020304" pitchFamily="18" charset="0"/>
                 <a:cs typeface="Times New Roman" panose="02020603050405020304" pitchFamily="18" charset="0"/>
               </a:rPr>
-              <a:t>carro</a:t>
-            </a:r>
-            <a:r>
-              <a:rPr lang="pt-BR" sz="2400" dirty="0">
-                <a:solidFill>
-                  <a:schemeClr val="tx1"/>
-                </a:solidFill>
-                <a:latin typeface="Times New Roman" panose="02020603050405020304" pitchFamily="18" charset="0"/>
-                <a:cs typeface="Times New Roman" panose="02020603050405020304" pitchFamily="18" charset="0"/>
-              </a:rPr>
-              <a:t>{ano:2001, marca:"</a:t>
+              <a:t>carro = </a:t>
+            </a:r>
+            <a:r>
+              <a:rPr lang="pt-BR" sz="2400" dirty="0">
+                <a:solidFill>
+                  <a:schemeClr val="tx1"/>
+                </a:solidFill>
+                <a:latin typeface="Times New Roman" panose="02020603050405020304" pitchFamily="18" charset="0"/>
+                <a:cs typeface="Times New Roman" panose="02020603050405020304" pitchFamily="18" charset="0"/>
+              </a:rPr>
+              <a:t>{ ano:2001, marca:"</a:t>
             </a:r>
             <a:r>
               <a:rPr lang="pt-BR" sz="2400" dirty="0" err="1">
@@ -17096,7 +17113,27 @@
                 <a:latin typeface="Times New Roman" panose="02020603050405020304" pitchFamily="18" charset="0"/>
                 <a:cs typeface="Times New Roman" panose="02020603050405020304" pitchFamily="18" charset="0"/>
               </a:rPr>
-              <a:t>(carro); </a:t>
+              <a:t>(</a:t>
+            </a:r>
+            <a:r>
+              <a:rPr lang="pt-BR" sz="2400" dirty="0" err="1">
+                <a:solidFill>
+                  <a:schemeClr val="tx1"/>
+                </a:solidFill>
+                <a:latin typeface="Times New Roman" panose="02020603050405020304" pitchFamily="18" charset="0"/>
+                <a:cs typeface="Times New Roman" panose="02020603050405020304" pitchFamily="18" charset="0"/>
+              </a:rPr>
+              <a:t>carro.ano</a:t>
+            </a:r>
+            <a:r>
+              <a:rPr lang="pt-BR" sz="2400" dirty="0">
+                <a:solidFill>
+                  <a:schemeClr val="tx1"/>
+                </a:solidFill>
+                <a:latin typeface="Times New Roman" panose="02020603050405020304" pitchFamily="18" charset="0"/>
+                <a:cs typeface="Times New Roman" panose="02020603050405020304" pitchFamily="18" charset="0"/>
+              </a:rPr>
+              <a:t>); </a:t>
             </a:r>
           </a:p>
           <a:p>

</xml_diff>

<commit_message>
Exec PHP 15/10/2024 2024.2
</commit_message>
<xml_diff>
--- a/01 Classes/Aula 09 Desenvolvimento Web PHP - JS.pptx
+++ b/01 Classes/Aula 09 Desenvolvimento Web PHP - JS.pptx
@@ -14816,7 +14816,7 @@
             <a:r>
               <a:rPr lang="pt-BR" sz="2400" b="1" dirty="0">
                 <a:solidFill>
-                  <a:schemeClr val="tx1"/>
+                  <a:srgbClr val="FF0000"/>
                 </a:solidFill>
                 <a:latin typeface="Times New Roman" panose="02020603050405020304" pitchFamily="18" charset="0"/>
                 <a:cs typeface="Times New Roman" panose="02020603050405020304" pitchFamily="18" charset="0"/>
@@ -14836,7 +14836,7 @@
             <a:r>
               <a:rPr lang="pt-BR" sz="2400" b="1" dirty="0">
                 <a:solidFill>
-                  <a:srgbClr val="FF0000"/>
+                  <a:schemeClr val="tx1"/>
                 </a:solidFill>
                 <a:latin typeface="Times New Roman" panose="02020603050405020304" pitchFamily="18" charset="0"/>
                 <a:cs typeface="Times New Roman" panose="02020603050405020304" pitchFamily="18" charset="0"/>
@@ -14923,15 +14923,18 @@
                 <a:latin typeface="Times New Roman" panose="02020603050405020304" pitchFamily="18" charset="0"/>
                 <a:cs typeface="Times New Roman" panose="02020603050405020304" pitchFamily="18" charset="0"/>
               </a:rPr>
-              <a:t>num = 18</a:t>
-            </a:r>
-            <a:endParaRPr lang="pt-BR" sz="2400" b="1" dirty="0">
-              <a:solidFill>
-                <a:schemeClr val="tx1"/>
-              </a:solidFill>
-              <a:latin typeface="Times New Roman" panose="02020603050405020304" pitchFamily="18" charset="0"/>
-              <a:cs typeface="Times New Roman" panose="02020603050405020304" pitchFamily="18" charset="0"/>
-            </a:endParaRPr>
+              <a:t>num = 18 // </a:t>
+            </a:r>
+            <a:r>
+              <a:rPr lang="pt-BR" sz="2400" b="1" dirty="0">
+                <a:solidFill>
+                  <a:srgbClr val="FF0000"/>
+                </a:solidFill>
+                <a:latin typeface="Times New Roman" panose="02020603050405020304" pitchFamily="18" charset="0"/>
+                <a:cs typeface="Times New Roman" panose="02020603050405020304" pitchFamily="18" charset="0"/>
+              </a:rPr>
+              <a:t>escopo Local</a:t>
+            </a:r>
           </a:p>
           <a:p>
             <a:pPr marL="0" indent="0" algn="just">
@@ -16021,7 +16024,47 @@
                 <a:latin typeface="Times New Roman" panose="02020603050405020304" pitchFamily="18" charset="0"/>
                 <a:cs typeface="Times New Roman" panose="02020603050405020304" pitchFamily="18" charset="0"/>
               </a:rPr>
-              <a:t>num = 18</a:t>
+              <a:t>num = 18 // </a:t>
+            </a:r>
+            <a:r>
+              <a:rPr lang="pt-BR" sz="2400" b="1" dirty="0">
+                <a:solidFill>
+                  <a:srgbClr val="FF0000"/>
+                </a:solidFill>
+                <a:latin typeface="Times New Roman" panose="02020603050405020304" pitchFamily="18" charset="0"/>
+                <a:cs typeface="Times New Roman" panose="02020603050405020304" pitchFamily="18" charset="0"/>
+              </a:rPr>
+              <a:t>escopo Global</a:t>
+            </a:r>
+          </a:p>
+          <a:p>
+            <a:pPr marL="0" indent="0" algn="just">
+              <a:buNone/>
+            </a:pPr>
+            <a:r>
+              <a:rPr lang="pt-BR" sz="2400" b="1" dirty="0">
+                <a:solidFill>
+                  <a:schemeClr val="tx1"/>
+                </a:solidFill>
+                <a:latin typeface="Times New Roman" panose="02020603050405020304" pitchFamily="18" charset="0"/>
+                <a:cs typeface="Times New Roman" panose="02020603050405020304" pitchFamily="18" charset="0"/>
+              </a:rPr>
+              <a:t>	}</a:t>
+            </a:r>
+          </a:p>
+          <a:p>
+            <a:pPr marL="0" indent="0" algn="just">
+              <a:buNone/>
+            </a:pPr>
+            <a:r>
+              <a:rPr lang="pt-BR" sz="2400" b="1">
+                <a:solidFill>
+                  <a:schemeClr val="tx1"/>
+                </a:solidFill>
+                <a:latin typeface="Times New Roman" panose="02020603050405020304" pitchFamily="18" charset="0"/>
+                <a:cs typeface="Times New Roman" panose="02020603050405020304" pitchFamily="18" charset="0"/>
+              </a:rPr>
+              <a:t>	</a:t>
             </a:r>
             <a:endParaRPr lang="pt-BR" sz="2400" b="1" dirty="0">
               <a:solidFill>
@@ -16030,21 +16073,6 @@
               <a:latin typeface="Times New Roman" panose="02020603050405020304" pitchFamily="18" charset="0"/>
               <a:cs typeface="Times New Roman" panose="02020603050405020304" pitchFamily="18" charset="0"/>
             </a:endParaRPr>
-          </a:p>
-          <a:p>
-            <a:pPr marL="0" indent="0" algn="just">
-              <a:buNone/>
-            </a:pPr>
-            <a:r>
-              <a:rPr lang="pt-BR" sz="2400" b="1" dirty="0">
-                <a:solidFill>
-                  <a:schemeClr val="tx1"/>
-                </a:solidFill>
-                <a:latin typeface="Times New Roman" panose="02020603050405020304" pitchFamily="18" charset="0"/>
-                <a:cs typeface="Times New Roman" panose="02020603050405020304" pitchFamily="18" charset="0"/>
-              </a:rPr>
-              <a:t>	}</a:t>
-            </a:r>
           </a:p>
           <a:p>
             <a:pPr marL="0" indent="0" algn="just">

</xml_diff>